<commit_message>
chap4: figures need both audio and video
</commit_message>
<xml_diff>
--- a/graphs/source/media-app-stack.pptx
+++ b/graphs/source/media-app-stack.pptx
@@ -290,7 +290,7 @@
           <a:p>
             <a:fld id="{40CA469B-057B-A14D-B584-C7C64D035322}" type="datetimeFigureOut">
               <a:rPr lang="en-US" smtClean="0"/>
-              <a:t>18/03/14</a:t>
+              <a:t>21/03/14</a:t>
             </a:fld>
             <a:endParaRPr lang="en-US"/>
           </a:p>
@@ -460,7 +460,7 @@
           <a:p>
             <a:fld id="{40CA469B-057B-A14D-B584-C7C64D035322}" type="datetimeFigureOut">
               <a:rPr lang="en-US" smtClean="0"/>
-              <a:t>18/03/14</a:t>
+              <a:t>21/03/14</a:t>
             </a:fld>
             <a:endParaRPr lang="en-US"/>
           </a:p>
@@ -640,7 +640,7 @@
           <a:p>
             <a:fld id="{40CA469B-057B-A14D-B584-C7C64D035322}" type="datetimeFigureOut">
               <a:rPr lang="en-US" smtClean="0"/>
-              <a:t>18/03/14</a:t>
+              <a:t>21/03/14</a:t>
             </a:fld>
             <a:endParaRPr lang="en-US"/>
           </a:p>
@@ -810,7 +810,7 @@
           <a:p>
             <a:fld id="{40CA469B-057B-A14D-B584-C7C64D035322}" type="datetimeFigureOut">
               <a:rPr lang="en-US" smtClean="0"/>
-              <a:t>18/03/14</a:t>
+              <a:t>21/03/14</a:t>
             </a:fld>
             <a:endParaRPr lang="en-US"/>
           </a:p>
@@ -1056,7 +1056,7 @@
           <a:p>
             <a:fld id="{40CA469B-057B-A14D-B584-C7C64D035322}" type="datetimeFigureOut">
               <a:rPr lang="en-US" smtClean="0"/>
-              <a:t>18/03/14</a:t>
+              <a:t>21/03/14</a:t>
             </a:fld>
             <a:endParaRPr lang="en-US"/>
           </a:p>
@@ -1344,7 +1344,7 @@
           <a:p>
             <a:fld id="{40CA469B-057B-A14D-B584-C7C64D035322}" type="datetimeFigureOut">
               <a:rPr lang="en-US" smtClean="0"/>
-              <a:t>18/03/14</a:t>
+              <a:t>21/03/14</a:t>
             </a:fld>
             <a:endParaRPr lang="en-US"/>
           </a:p>
@@ -1766,7 +1766,7 @@
           <a:p>
             <a:fld id="{40CA469B-057B-A14D-B584-C7C64D035322}" type="datetimeFigureOut">
               <a:rPr lang="en-US" smtClean="0"/>
-              <a:t>18/03/14</a:t>
+              <a:t>21/03/14</a:t>
             </a:fld>
             <a:endParaRPr lang="en-US"/>
           </a:p>
@@ -1884,7 +1884,7 @@
           <a:p>
             <a:fld id="{40CA469B-057B-A14D-B584-C7C64D035322}" type="datetimeFigureOut">
               <a:rPr lang="en-US" smtClean="0"/>
-              <a:t>18/03/14</a:t>
+              <a:t>21/03/14</a:t>
             </a:fld>
             <a:endParaRPr lang="en-US"/>
           </a:p>
@@ -1979,7 +1979,7 @@
           <a:p>
             <a:fld id="{40CA469B-057B-A14D-B584-C7C64D035322}" type="datetimeFigureOut">
               <a:rPr lang="en-US" smtClean="0"/>
-              <a:t>18/03/14</a:t>
+              <a:t>21/03/14</a:t>
             </a:fld>
             <a:endParaRPr lang="en-US"/>
           </a:p>
@@ -2256,7 +2256,7 @@
           <a:p>
             <a:fld id="{40CA469B-057B-A14D-B584-C7C64D035322}" type="datetimeFigureOut">
               <a:rPr lang="en-US" smtClean="0"/>
-              <a:t>18/03/14</a:t>
+              <a:t>21/03/14</a:t>
             </a:fld>
             <a:endParaRPr lang="en-US"/>
           </a:p>
@@ -2509,7 +2509,7 @@
           <a:p>
             <a:fld id="{40CA469B-057B-A14D-B584-C7C64D035322}" type="datetimeFigureOut">
               <a:rPr lang="en-US" smtClean="0"/>
-              <a:t>18/03/14</a:t>
+              <a:t>21/03/14</a:t>
             </a:fld>
             <a:endParaRPr lang="en-US"/>
           </a:p>
@@ -2722,7 +2722,7 @@
           <a:p>
             <a:fld id="{40CA469B-057B-A14D-B584-C7C64D035322}" type="datetimeFigureOut">
               <a:rPr lang="en-US" smtClean="0"/>
-              <a:t>18/03/14</a:t>
+              <a:t>21/03/14</a:t>
             </a:fld>
             <a:endParaRPr lang="en-US"/>
           </a:p>
@@ -3099,6 +3099,66 @@
       </p:grpSpPr>
       <p:sp>
         <p:nvSpPr>
+          <p:cNvPr id="20" name="Rectangle 19"/>
+          <p:cNvSpPr/>
+          <p:nvPr/>
+        </p:nvSpPr>
+        <p:spPr>
+          <a:xfrm>
+            <a:off x="1788855" y="2102801"/>
+            <a:ext cx="7032531" cy="2648983"/>
+          </a:xfrm>
+          <a:prstGeom prst="rect">
+            <a:avLst/>
+          </a:prstGeom>
+          <a:solidFill>
+            <a:schemeClr val="bg2"/>
+          </a:solidFill>
+          <a:ln w="3175" cmpd="sng">
+            <a:solidFill>
+              <a:schemeClr val="tx1"/>
+            </a:solidFill>
+            <a:prstDash val="solid"/>
+          </a:ln>
+        </p:spPr>
+        <p:style>
+          <a:lnRef idx="2">
+            <a:schemeClr val="accent4">
+              <a:shade val="50000"/>
+            </a:schemeClr>
+          </a:lnRef>
+          <a:fillRef idx="1">
+            <a:schemeClr val="accent4"/>
+          </a:fillRef>
+          <a:effectRef idx="0">
+            <a:schemeClr val="accent4"/>
+          </a:effectRef>
+          <a:fontRef idx="minor">
+            <a:schemeClr val="lt1"/>
+          </a:fontRef>
+        </p:style>
+        <p:txBody>
+          <a:bodyPr rtlCol="0" anchor="t"/>
+          <a:lstStyle/>
+          <a:p>
+            <a:r>
+              <a:rPr lang="en-US" sz="2400" dirty="0" smtClean="0">
+                <a:solidFill>
+                  <a:schemeClr val="tx1"/>
+                </a:solidFill>
+              </a:rPr>
+              <a:t>RTP</a:t>
+            </a:r>
+            <a:endParaRPr lang="en-US" sz="2400" dirty="0">
+              <a:solidFill>
+                <a:schemeClr val="tx1"/>
+              </a:solidFill>
+            </a:endParaRPr>
+          </a:p>
+        </p:txBody>
+      </p:sp>
+      <p:sp>
+        <p:nvSpPr>
           <p:cNvPr id="4" name="Rectangle 3"/>
           <p:cNvSpPr/>
           <p:nvPr/>
@@ -3112,7 +3172,11 @@
             <a:avLst/>
           </a:prstGeom>
           <a:noFill/>
-          <a:ln w="3175" cmpd="sng"/>
+          <a:ln w="3175" cmpd="sng">
+            <a:solidFill>
+              <a:schemeClr val="bg2"/>
+            </a:solidFill>
+          </a:ln>
         </p:spPr>
         <p:style>
           <a:lnRef idx="2">
@@ -3139,44 +3203,353 @@
       </p:sp>
       <p:sp>
         <p:nvSpPr>
-          <p:cNvPr id="5" name="TextBox 4"/>
-          <p:cNvSpPr txBox="1"/>
+          <p:cNvPr id="9" name="Rectangle 8"/>
+          <p:cNvSpPr/>
           <p:nvPr/>
         </p:nvSpPr>
         <p:spPr>
           <a:xfrm>
-            <a:off x="0" y="5638671"/>
-            <a:ext cx="2143898" cy="369332"/>
+            <a:off x="6404378" y="2539745"/>
+            <a:ext cx="1734236" cy="914856"/>
           </a:xfrm>
           <a:prstGeom prst="rect">
             <a:avLst/>
           </a:prstGeom>
-          <a:noFill/>
-        </p:spPr>
-        <p:txBody>
-          <a:bodyPr wrap="square" rtlCol="0">
-            <a:spAutoFit/>
-          </a:bodyPr>
-          <a:lstStyle/>
-          <a:p>
-            <a:r>
-              <a:rPr lang="en-US" dirty="0" smtClean="0"/>
-              <a:t>Sending Endpoint</a:t>
-            </a:r>
-            <a:endParaRPr lang="en-US" dirty="0"/>
-          </a:p>
-        </p:txBody>
-      </p:sp>
-      <p:sp>
-        <p:nvSpPr>
-          <p:cNvPr id="6" name="Rectangle 5"/>
+          <a:solidFill>
+            <a:schemeClr val="accent6">
+              <a:lumMod val="20000"/>
+              <a:lumOff val="80000"/>
+            </a:schemeClr>
+          </a:solidFill>
+          <a:ln w="3175" cmpd="sng">
+            <a:solidFill>
+              <a:schemeClr val="tx1"/>
+            </a:solidFill>
+            <a:prstDash val="dash"/>
+          </a:ln>
+        </p:spPr>
+        <p:style>
+          <a:lnRef idx="2">
+            <a:schemeClr val="accent4">
+              <a:shade val="50000"/>
+            </a:schemeClr>
+          </a:lnRef>
+          <a:fillRef idx="1">
+            <a:schemeClr val="accent4"/>
+          </a:fillRef>
+          <a:effectRef idx="0">
+            <a:schemeClr val="accent4"/>
+          </a:effectRef>
+          <a:fontRef idx="minor">
+            <a:schemeClr val="lt1"/>
+          </a:fontRef>
+        </p:style>
+        <p:txBody>
+          <a:bodyPr rtlCol="0" anchor="ctr"/>
+          <a:lstStyle/>
+          <a:p>
+            <a:pPr algn="ctr"/>
+            <a:r>
+              <a:rPr lang="en-US" sz="2000" dirty="0" smtClean="0">
+                <a:solidFill>
+                  <a:schemeClr val="tx1"/>
+                </a:solidFill>
+              </a:rPr>
+              <a:t>Rate Controller</a:t>
+            </a:r>
+            <a:endParaRPr lang="en-US" sz="2000" dirty="0">
+              <a:solidFill>
+                <a:schemeClr val="tx1"/>
+              </a:solidFill>
+            </a:endParaRPr>
+          </a:p>
+        </p:txBody>
+      </p:sp>
+      <p:sp>
+        <p:nvSpPr>
+          <p:cNvPr id="10" name="Rectangle 9"/>
           <p:cNvSpPr/>
           <p:nvPr/>
         </p:nvSpPr>
         <p:spPr>
           <a:xfrm>
-            <a:off x="2307762" y="892112"/>
-            <a:ext cx="5612372" cy="873891"/>
+            <a:off x="2621831" y="4000784"/>
+            <a:ext cx="3004189" cy="535826"/>
+          </a:xfrm>
+          <a:prstGeom prst="rect">
+            <a:avLst/>
+          </a:prstGeom>
+          <a:solidFill>
+            <a:schemeClr val="accent6">
+              <a:lumMod val="20000"/>
+              <a:lumOff val="80000"/>
+            </a:schemeClr>
+          </a:solidFill>
+          <a:ln w="3175" cmpd="sng">
+            <a:solidFill>
+              <a:schemeClr val="tx1"/>
+            </a:solidFill>
+            <a:prstDash val="dash"/>
+          </a:ln>
+        </p:spPr>
+        <p:style>
+          <a:lnRef idx="2">
+            <a:schemeClr val="accent4">
+              <a:shade val="50000"/>
+            </a:schemeClr>
+          </a:lnRef>
+          <a:fillRef idx="1">
+            <a:schemeClr val="accent4"/>
+          </a:fillRef>
+          <a:effectRef idx="0">
+            <a:schemeClr val="accent4"/>
+          </a:effectRef>
+          <a:fontRef idx="minor">
+            <a:schemeClr val="lt1"/>
+          </a:fontRef>
+        </p:style>
+        <p:txBody>
+          <a:bodyPr rtlCol="0" anchor="ctr"/>
+          <a:lstStyle/>
+          <a:p>
+            <a:pPr algn="ctr"/>
+            <a:r>
+              <a:rPr lang="en-US" dirty="0" smtClean="0">
+                <a:solidFill>
+                  <a:schemeClr val="tx1"/>
+                </a:solidFill>
+              </a:rPr>
+              <a:t>Scheduler or </a:t>
+            </a:r>
+          </a:p>
+          <a:p>
+            <a:pPr algn="ctr"/>
+            <a:r>
+              <a:rPr lang="en-US" dirty="0" smtClean="0">
+                <a:solidFill>
+                  <a:schemeClr val="tx1"/>
+                </a:solidFill>
+              </a:rPr>
+              <a:t>Pacing Buffer</a:t>
+            </a:r>
+            <a:endParaRPr lang="en-US" dirty="0">
+              <a:solidFill>
+                <a:schemeClr val="tx1"/>
+              </a:solidFill>
+            </a:endParaRPr>
+          </a:p>
+        </p:txBody>
+      </p:sp>
+      <p:sp>
+        <p:nvSpPr>
+          <p:cNvPr id="11" name="Rectangle 10"/>
+          <p:cNvSpPr/>
+          <p:nvPr/>
+        </p:nvSpPr>
+        <p:spPr>
+          <a:xfrm>
+            <a:off x="2621831" y="2539745"/>
+            <a:ext cx="1652304" cy="1258770"/>
+          </a:xfrm>
+          <a:prstGeom prst="rect">
+            <a:avLst/>
+          </a:prstGeom>
+          <a:solidFill>
+            <a:schemeClr val="accent6">
+              <a:lumMod val="20000"/>
+              <a:lumOff val="80000"/>
+            </a:schemeClr>
+          </a:solidFill>
+          <a:ln w="3175" cmpd="sng">
+            <a:solidFill>
+              <a:schemeClr val="tx1"/>
+            </a:solidFill>
+            <a:prstDash val="dash"/>
+          </a:ln>
+        </p:spPr>
+        <p:style>
+          <a:lnRef idx="2">
+            <a:schemeClr val="accent4">
+              <a:shade val="50000"/>
+            </a:schemeClr>
+          </a:lnRef>
+          <a:fillRef idx="1">
+            <a:schemeClr val="accent4"/>
+          </a:fillRef>
+          <a:effectRef idx="0">
+            <a:schemeClr val="accent4"/>
+          </a:effectRef>
+          <a:fontRef idx="minor">
+            <a:schemeClr val="lt1"/>
+          </a:fontRef>
+        </p:style>
+        <p:txBody>
+          <a:bodyPr rtlCol="0" anchor="ctr"/>
+          <a:lstStyle/>
+          <a:p>
+            <a:pPr algn="ctr"/>
+            <a:r>
+              <a:rPr lang="en-US" dirty="0" smtClean="0">
+                <a:solidFill>
+                  <a:schemeClr val="tx1"/>
+                </a:solidFill>
+              </a:rPr>
+              <a:t>Media </a:t>
+            </a:r>
+            <a:r>
+              <a:rPr lang="en-US" dirty="0" err="1" smtClean="0">
+                <a:solidFill>
+                  <a:schemeClr val="tx1"/>
+                </a:solidFill>
+              </a:rPr>
+              <a:t>Packetizer</a:t>
+            </a:r>
+            <a:endParaRPr lang="en-US" dirty="0">
+              <a:solidFill>
+                <a:schemeClr val="tx1"/>
+              </a:solidFill>
+            </a:endParaRPr>
+          </a:p>
+        </p:txBody>
+      </p:sp>
+      <p:sp>
+        <p:nvSpPr>
+          <p:cNvPr id="13" name="Rectangle 12"/>
+          <p:cNvSpPr/>
+          <p:nvPr/>
+        </p:nvSpPr>
+        <p:spPr>
+          <a:xfrm>
+            <a:off x="5899128" y="3798516"/>
+            <a:ext cx="2239486" cy="738094"/>
+          </a:xfrm>
+          <a:prstGeom prst="rect">
+            <a:avLst/>
+          </a:prstGeom>
+          <a:solidFill>
+            <a:schemeClr val="accent6">
+              <a:lumMod val="20000"/>
+              <a:lumOff val="80000"/>
+            </a:schemeClr>
+          </a:solidFill>
+          <a:ln w="3175" cmpd="sng">
+            <a:solidFill>
+              <a:schemeClr val="tx1"/>
+            </a:solidFill>
+            <a:prstDash val="dash"/>
+          </a:ln>
+        </p:spPr>
+        <p:style>
+          <a:lnRef idx="2">
+            <a:schemeClr val="accent4">
+              <a:shade val="50000"/>
+            </a:schemeClr>
+          </a:lnRef>
+          <a:fillRef idx="1">
+            <a:schemeClr val="accent4"/>
+          </a:fillRef>
+          <a:effectRef idx="0">
+            <a:schemeClr val="accent4"/>
+          </a:effectRef>
+          <a:fontRef idx="minor">
+            <a:schemeClr val="lt1"/>
+          </a:fontRef>
+        </p:style>
+        <p:txBody>
+          <a:bodyPr rtlCol="0" anchor="ctr"/>
+          <a:lstStyle/>
+          <a:p>
+            <a:pPr algn="ctr"/>
+            <a:r>
+              <a:rPr lang="en-US" dirty="0" smtClean="0">
+                <a:solidFill>
+                  <a:schemeClr val="tx1"/>
+                </a:solidFill>
+              </a:rPr>
+              <a:t>RTCP Feedback</a:t>
+            </a:r>
+            <a:endParaRPr lang="en-US" dirty="0">
+              <a:solidFill>
+                <a:schemeClr val="tx1"/>
+              </a:solidFill>
+            </a:endParaRPr>
+          </a:p>
+        </p:txBody>
+      </p:sp>
+      <p:sp>
+        <p:nvSpPr>
+          <p:cNvPr id="18" name="Rectangle 17"/>
+          <p:cNvSpPr/>
+          <p:nvPr/>
+        </p:nvSpPr>
+        <p:spPr>
+          <a:xfrm>
+            <a:off x="4615521" y="2555957"/>
+            <a:ext cx="1584027" cy="898644"/>
+          </a:xfrm>
+          <a:prstGeom prst="rect">
+            <a:avLst/>
+          </a:prstGeom>
+          <a:solidFill>
+            <a:schemeClr val="accent6">
+              <a:lumMod val="20000"/>
+              <a:lumOff val="80000"/>
+            </a:schemeClr>
+          </a:solidFill>
+          <a:ln w="3175" cmpd="sng">
+            <a:solidFill>
+              <a:schemeClr val="tx1"/>
+            </a:solidFill>
+            <a:prstDash val="dash"/>
+          </a:ln>
+        </p:spPr>
+        <p:style>
+          <a:lnRef idx="2">
+            <a:schemeClr val="accent4">
+              <a:shade val="50000"/>
+            </a:schemeClr>
+          </a:lnRef>
+          <a:fillRef idx="1">
+            <a:schemeClr val="accent4"/>
+          </a:fillRef>
+          <a:effectRef idx="0">
+            <a:schemeClr val="accent4"/>
+          </a:effectRef>
+          <a:fontRef idx="minor">
+            <a:schemeClr val="lt1"/>
+          </a:fontRef>
+        </p:style>
+        <p:txBody>
+          <a:bodyPr rtlCol="0" anchor="ctr"/>
+          <a:lstStyle/>
+          <a:p>
+            <a:pPr algn="ctr"/>
+            <a:r>
+              <a:rPr lang="en-US" dirty="0" smtClean="0">
+                <a:solidFill>
+                  <a:schemeClr val="tx1"/>
+                </a:solidFill>
+              </a:rPr>
+              <a:t>Media Redundancy</a:t>
+            </a:r>
+            <a:endParaRPr lang="en-US" dirty="0">
+              <a:solidFill>
+                <a:schemeClr val="tx1"/>
+              </a:solidFill>
+            </a:endParaRPr>
+          </a:p>
+        </p:txBody>
+      </p:sp>
+      <p:sp>
+        <p:nvSpPr>
+          <p:cNvPr id="17" name="Rectangle 16"/>
+          <p:cNvSpPr/>
+          <p:nvPr/>
+        </p:nvSpPr>
+        <p:spPr>
+          <a:xfrm>
+            <a:off x="2430657" y="892112"/>
+            <a:ext cx="5912790" cy="873891"/>
           </a:xfrm>
           <a:prstGeom prst="rect">
             <a:avLst/>
@@ -3217,7 +3590,23 @@
                   <a:schemeClr val="tx1"/>
                 </a:solidFill>
               </a:rPr>
-              <a:t>Media Encoder (Video)</a:t>
+              <a:t>Media Decoder </a:t>
+            </a:r>
+            <a:r>
+              <a:rPr lang="en-US" dirty="0" smtClean="0">
+                <a:solidFill>
+                  <a:schemeClr val="tx1"/>
+                </a:solidFill>
+              </a:rPr>
+              <a:t>(Audio/Video</a:t>
+            </a:r>
+            <a:r>
+              <a:rPr lang="en-US" dirty="0" smtClean="0">
+                <a:solidFill>
+                  <a:schemeClr val="tx1"/>
+                </a:solidFill>
+              </a:rPr>
+              <a:t>)</a:t>
             </a:r>
             <a:endParaRPr lang="en-US" dirty="0">
               <a:solidFill>
@@ -3229,14 +3618,14 @@
       </p:sp>
       <p:sp>
         <p:nvSpPr>
-          <p:cNvPr id="7" name="Rectangle 6"/>
+          <p:cNvPr id="19" name="Rectangle 18"/>
           <p:cNvSpPr/>
           <p:nvPr/>
         </p:nvSpPr>
         <p:spPr>
           <a:xfrm>
-            <a:off x="2307762" y="4960017"/>
-            <a:ext cx="5612372" cy="873891"/>
+            <a:off x="2430656" y="4960017"/>
+            <a:ext cx="5912791" cy="873891"/>
           </a:xfrm>
           <a:prstGeom prst="rect">
             <a:avLst/>
@@ -3289,26 +3678,26 @@
       </p:sp>
       <p:sp>
         <p:nvSpPr>
-          <p:cNvPr id="8" name="Rectangle 7"/>
+          <p:cNvPr id="21" name="Rectangle 20"/>
           <p:cNvSpPr/>
           <p:nvPr/>
         </p:nvSpPr>
         <p:spPr>
           <a:xfrm>
-            <a:off x="1665961" y="2102801"/>
-            <a:ext cx="6827700" cy="2648983"/>
+            <a:off x="327727" y="837494"/>
+            <a:ext cx="1242641" cy="4738131"/>
           </a:xfrm>
           <a:prstGeom prst="rect">
             <a:avLst/>
           </a:prstGeom>
           <a:solidFill>
-            <a:schemeClr val="bg2"/>
+            <a:srgbClr val="E8E8E8"/>
           </a:solidFill>
           <a:ln w="3175" cmpd="sng">
             <a:solidFill>
               <a:schemeClr val="tx1"/>
             </a:solidFill>
-            <a:prstDash val="solid"/>
+            <a:prstDash val="sysDash"/>
           </a:ln>
         </p:spPr>
         <p:style>
@@ -3328,416 +3717,59 @@
           </a:fontRef>
         </p:style>
         <p:txBody>
-          <a:bodyPr rtlCol="0" anchor="t"/>
-          <a:lstStyle/>
-          <a:p>
+          <a:bodyPr vert="vert270" rtlCol="0" anchor="ctr"/>
+          <a:lstStyle/>
+          <a:p>
+            <a:pPr algn="ctr"/>
             <a:r>
               <a:rPr lang="en-US" sz="2400" dirty="0" smtClean="0">
                 <a:solidFill>
                   <a:schemeClr val="tx1"/>
                 </a:solidFill>
               </a:rPr>
-              <a:t>RTP</a:t>
-            </a:r>
-            <a:endParaRPr lang="en-US" sz="2400" dirty="0">
-              <a:solidFill>
-                <a:schemeClr val="tx1"/>
-              </a:solidFill>
-            </a:endParaRPr>
-          </a:p>
-        </p:txBody>
-      </p:sp>
-      <p:sp>
-        <p:nvSpPr>
-          <p:cNvPr id="9" name="Rectangle 8"/>
-          <p:cNvSpPr/>
-          <p:nvPr/>
-        </p:nvSpPr>
-        <p:spPr>
-          <a:xfrm>
-            <a:off x="6185898" y="2594365"/>
-            <a:ext cx="1734236" cy="914856"/>
-          </a:xfrm>
-          <a:prstGeom prst="rect">
-            <a:avLst/>
-          </a:prstGeom>
-          <a:solidFill>
-            <a:schemeClr val="accent6">
-              <a:lumMod val="20000"/>
-              <a:lumOff val="80000"/>
-            </a:schemeClr>
-          </a:solidFill>
-          <a:ln w="3175" cmpd="sng">
-            <a:solidFill>
-              <a:schemeClr val="tx1"/>
-            </a:solidFill>
-            <a:prstDash val="dash"/>
-          </a:ln>
-        </p:spPr>
-        <p:style>
-          <a:lnRef idx="2">
-            <a:schemeClr val="accent4">
-              <a:shade val="50000"/>
-            </a:schemeClr>
-          </a:lnRef>
-          <a:fillRef idx="1">
-            <a:schemeClr val="accent4"/>
-          </a:fillRef>
-          <a:effectRef idx="0">
-            <a:schemeClr val="accent4"/>
-          </a:effectRef>
-          <a:fontRef idx="minor">
-            <a:schemeClr val="lt1"/>
-          </a:fontRef>
-        </p:style>
-        <p:txBody>
-          <a:bodyPr rtlCol="0" anchor="ctr"/>
-          <a:lstStyle/>
-          <a:p>
-            <a:pPr algn="ctr"/>
-            <a:r>
-              <a:rPr lang="en-US" sz="2000" dirty="0" smtClean="0">
+              <a:t>Application </a:t>
+            </a:r>
+            <a:r>
+              <a:rPr lang="en-US" sz="2400" dirty="0">
                 <a:solidFill>
                   <a:schemeClr val="tx1"/>
                 </a:solidFill>
               </a:rPr>
-              <a:t>Rate Controller</a:t>
-            </a:r>
-            <a:endParaRPr lang="en-US" sz="2000" dirty="0">
-              <a:solidFill>
-                <a:schemeClr val="tx1"/>
-              </a:solidFill>
-            </a:endParaRPr>
-          </a:p>
-        </p:txBody>
-      </p:sp>
-      <p:sp>
-        <p:nvSpPr>
-          <p:cNvPr id="10" name="Rectangle 9"/>
-          <p:cNvSpPr/>
+              <a:t>Preferences</a:t>
+            </a:r>
+          </a:p>
+        </p:txBody>
+      </p:sp>
+      <p:sp>
+        <p:nvSpPr>
+          <p:cNvPr id="22" name="TextBox 21"/>
+          <p:cNvSpPr txBox="1"/>
           <p:nvPr/>
         </p:nvSpPr>
         <p:spPr>
           <a:xfrm>
-            <a:off x="2403351" y="4055404"/>
-            <a:ext cx="3004189" cy="535826"/>
+            <a:off x="122895" y="5638671"/>
+            <a:ext cx="2307762" cy="369332"/>
           </a:xfrm>
           <a:prstGeom prst="rect">
             <a:avLst/>
           </a:prstGeom>
-          <a:solidFill>
-            <a:schemeClr val="accent6">
-              <a:lumMod val="20000"/>
-              <a:lumOff val="80000"/>
-            </a:schemeClr>
-          </a:solidFill>
-          <a:ln w="3175" cmpd="sng">
-            <a:solidFill>
-              <a:schemeClr val="tx1"/>
-            </a:solidFill>
-            <a:prstDash val="dash"/>
-          </a:ln>
-        </p:spPr>
-        <p:style>
-          <a:lnRef idx="2">
-            <a:schemeClr val="accent4">
-              <a:shade val="50000"/>
-            </a:schemeClr>
-          </a:lnRef>
-          <a:fillRef idx="1">
-            <a:schemeClr val="accent4"/>
-          </a:fillRef>
-          <a:effectRef idx="0">
-            <a:schemeClr val="accent4"/>
-          </a:effectRef>
-          <a:fontRef idx="minor">
-            <a:schemeClr val="lt1"/>
-          </a:fontRef>
-        </p:style>
-        <p:txBody>
-          <a:bodyPr rtlCol="0" anchor="ctr"/>
-          <a:lstStyle/>
-          <a:p>
-            <a:pPr algn="ctr"/>
+          <a:noFill/>
+        </p:spPr>
+        <p:txBody>
+          <a:bodyPr wrap="square" rtlCol="0">
+            <a:spAutoFit/>
+          </a:bodyPr>
+          <a:lstStyle/>
+          <a:p>
             <a:r>
               <a:rPr lang="en-US" dirty="0" smtClean="0">
-                <a:solidFill>
-                  <a:schemeClr val="tx1"/>
-                </a:solidFill>
+                <a:latin typeface="+mj-lt"/>
               </a:rPr>
-              <a:t>Scheduler or </a:t>
-            </a:r>
-          </a:p>
-          <a:p>
-            <a:pPr algn="ctr"/>
-            <a:r>
-              <a:rPr lang="en-US" dirty="0" smtClean="0">
-                <a:solidFill>
-                  <a:schemeClr val="tx1"/>
-                </a:solidFill>
-              </a:rPr>
-              <a:t>Pacing Buffer</a:t>
+              <a:t>Sending Endpoint</a:t>
             </a:r>
             <a:endParaRPr lang="en-US" dirty="0">
-              <a:solidFill>
-                <a:schemeClr val="tx1"/>
-              </a:solidFill>
-            </a:endParaRPr>
-          </a:p>
-        </p:txBody>
-      </p:sp>
-      <p:sp>
-        <p:nvSpPr>
-          <p:cNvPr id="11" name="Rectangle 10"/>
-          <p:cNvSpPr/>
-          <p:nvPr/>
-        </p:nvSpPr>
-        <p:spPr>
-          <a:xfrm>
-            <a:off x="2403351" y="2594365"/>
-            <a:ext cx="1652304" cy="1258770"/>
-          </a:xfrm>
-          <a:prstGeom prst="rect">
-            <a:avLst/>
-          </a:prstGeom>
-          <a:solidFill>
-            <a:schemeClr val="accent6">
-              <a:lumMod val="20000"/>
-              <a:lumOff val="80000"/>
-            </a:schemeClr>
-          </a:solidFill>
-          <a:ln w="3175" cmpd="sng">
-            <a:solidFill>
-              <a:schemeClr val="tx1"/>
-            </a:solidFill>
-            <a:prstDash val="dash"/>
-          </a:ln>
-        </p:spPr>
-        <p:style>
-          <a:lnRef idx="2">
-            <a:schemeClr val="accent4">
-              <a:shade val="50000"/>
-            </a:schemeClr>
-          </a:lnRef>
-          <a:fillRef idx="1">
-            <a:schemeClr val="accent4"/>
-          </a:fillRef>
-          <a:effectRef idx="0">
-            <a:schemeClr val="accent4"/>
-          </a:effectRef>
-          <a:fontRef idx="minor">
-            <a:schemeClr val="lt1"/>
-          </a:fontRef>
-        </p:style>
-        <p:txBody>
-          <a:bodyPr rtlCol="0" anchor="ctr"/>
-          <a:lstStyle/>
-          <a:p>
-            <a:pPr algn="ctr"/>
-            <a:r>
-              <a:rPr lang="en-US" dirty="0" smtClean="0">
-                <a:solidFill>
-                  <a:schemeClr val="tx1"/>
-                </a:solidFill>
-              </a:rPr>
-              <a:t>Media </a:t>
-            </a:r>
-            <a:r>
-              <a:rPr lang="en-US" dirty="0" err="1" smtClean="0">
-                <a:solidFill>
-                  <a:schemeClr val="tx1"/>
-                </a:solidFill>
-              </a:rPr>
-              <a:t>Packetizer</a:t>
-            </a:r>
-            <a:endParaRPr lang="en-US" dirty="0">
-              <a:solidFill>
-                <a:schemeClr val="tx1"/>
-              </a:solidFill>
-            </a:endParaRPr>
-          </a:p>
-        </p:txBody>
-      </p:sp>
-      <p:sp>
-        <p:nvSpPr>
-          <p:cNvPr id="13" name="Rectangle 12"/>
-          <p:cNvSpPr/>
-          <p:nvPr/>
-        </p:nvSpPr>
-        <p:spPr>
-          <a:xfrm>
-            <a:off x="5680648" y="3853136"/>
-            <a:ext cx="2239486" cy="738094"/>
-          </a:xfrm>
-          <a:prstGeom prst="rect">
-            <a:avLst/>
-          </a:prstGeom>
-          <a:solidFill>
-            <a:schemeClr val="accent6">
-              <a:lumMod val="20000"/>
-              <a:lumOff val="80000"/>
-            </a:schemeClr>
-          </a:solidFill>
-          <a:ln w="3175" cmpd="sng">
-            <a:solidFill>
-              <a:schemeClr val="tx1"/>
-            </a:solidFill>
-            <a:prstDash val="dash"/>
-          </a:ln>
-        </p:spPr>
-        <p:style>
-          <a:lnRef idx="2">
-            <a:schemeClr val="accent4">
-              <a:shade val="50000"/>
-            </a:schemeClr>
-          </a:lnRef>
-          <a:fillRef idx="1">
-            <a:schemeClr val="accent4"/>
-          </a:fillRef>
-          <a:effectRef idx="0">
-            <a:schemeClr val="accent4"/>
-          </a:effectRef>
-          <a:fontRef idx="minor">
-            <a:schemeClr val="lt1"/>
-          </a:fontRef>
-        </p:style>
-        <p:txBody>
-          <a:bodyPr rtlCol="0" anchor="ctr"/>
-          <a:lstStyle/>
-          <a:p>
-            <a:pPr algn="ctr"/>
-            <a:r>
-              <a:rPr lang="en-US" dirty="0" smtClean="0">
-                <a:solidFill>
-                  <a:schemeClr val="tx1"/>
-                </a:solidFill>
-              </a:rPr>
-              <a:t>RTCP Feedback</a:t>
-            </a:r>
-            <a:endParaRPr lang="en-US" dirty="0">
-              <a:solidFill>
-                <a:schemeClr val="tx1"/>
-              </a:solidFill>
-            </a:endParaRPr>
-          </a:p>
-        </p:txBody>
-      </p:sp>
-      <p:sp>
-        <p:nvSpPr>
-          <p:cNvPr id="14" name="Rectangle 13"/>
-          <p:cNvSpPr/>
-          <p:nvPr/>
-        </p:nvSpPr>
-        <p:spPr>
-          <a:xfrm>
-            <a:off x="204832" y="837494"/>
-            <a:ext cx="1242641" cy="4738131"/>
-          </a:xfrm>
-          <a:prstGeom prst="rect">
-            <a:avLst/>
-          </a:prstGeom>
-          <a:solidFill>
-            <a:srgbClr val="E8E8E8"/>
-          </a:solidFill>
-          <a:ln w="3175" cmpd="sng">
-            <a:solidFill>
-              <a:schemeClr val="tx1"/>
-            </a:solidFill>
-            <a:prstDash val="sysDash"/>
-          </a:ln>
-        </p:spPr>
-        <p:style>
-          <a:lnRef idx="2">
-            <a:schemeClr val="accent4">
-              <a:shade val="50000"/>
-            </a:schemeClr>
-          </a:lnRef>
-          <a:fillRef idx="1">
-            <a:schemeClr val="accent4"/>
-          </a:fillRef>
-          <a:effectRef idx="0">
-            <a:schemeClr val="accent4"/>
-          </a:effectRef>
-          <a:fontRef idx="minor">
-            <a:schemeClr val="lt1"/>
-          </a:fontRef>
-        </p:style>
-        <p:txBody>
-          <a:bodyPr vert="vert270" rtlCol="0" anchor="ctr"/>
-          <a:lstStyle/>
-          <a:p>
-            <a:pPr algn="ctr"/>
-            <a:r>
-              <a:rPr lang="en-US" sz="2400" dirty="0" smtClean="0">
-                <a:solidFill>
-                  <a:schemeClr val="tx1"/>
-                </a:solidFill>
-              </a:rPr>
-              <a:t>Multimedia Application Settings</a:t>
-            </a:r>
-          </a:p>
-        </p:txBody>
-      </p:sp>
-      <p:sp>
-        <p:nvSpPr>
-          <p:cNvPr id="18" name="Rectangle 17"/>
-          <p:cNvSpPr/>
-          <p:nvPr/>
-        </p:nvSpPr>
-        <p:spPr>
-          <a:xfrm>
-            <a:off x="4397041" y="2610577"/>
-            <a:ext cx="1584027" cy="898644"/>
-          </a:xfrm>
-          <a:prstGeom prst="rect">
-            <a:avLst/>
-          </a:prstGeom>
-          <a:solidFill>
-            <a:schemeClr val="accent6">
-              <a:lumMod val="20000"/>
-              <a:lumOff val="80000"/>
-            </a:schemeClr>
-          </a:solidFill>
-          <a:ln w="3175" cmpd="sng">
-            <a:solidFill>
-              <a:schemeClr val="tx1"/>
-            </a:solidFill>
-            <a:prstDash val="dash"/>
-          </a:ln>
-        </p:spPr>
-        <p:style>
-          <a:lnRef idx="2">
-            <a:schemeClr val="accent4">
-              <a:shade val="50000"/>
-            </a:schemeClr>
-          </a:lnRef>
-          <a:fillRef idx="1">
-            <a:schemeClr val="accent4"/>
-          </a:fillRef>
-          <a:effectRef idx="0">
-            <a:schemeClr val="accent4"/>
-          </a:effectRef>
-          <a:fontRef idx="minor">
-            <a:schemeClr val="lt1"/>
-          </a:fontRef>
-        </p:style>
-        <p:txBody>
-          <a:bodyPr rtlCol="0" anchor="ctr"/>
-          <a:lstStyle/>
-          <a:p>
-            <a:pPr algn="ctr"/>
-            <a:r>
-              <a:rPr lang="en-US" dirty="0" smtClean="0">
-                <a:solidFill>
-                  <a:schemeClr val="tx1"/>
-                </a:solidFill>
-              </a:rPr>
-              <a:t>Media Redundancy</a:t>
-            </a:r>
-            <a:endParaRPr lang="en-US" dirty="0">
-              <a:solidFill>
-                <a:schemeClr val="tx1"/>
-              </a:solidFill>
+              <a:latin typeface="+mj-lt"/>
             </a:endParaRPr>
           </a:p>
         </p:txBody>
@@ -3787,7 +3819,11 @@
             <a:avLst/>
           </a:prstGeom>
           <a:noFill/>
-          <a:ln w="3175" cmpd="sng"/>
+          <a:ln w="3175" cmpd="sng">
+            <a:solidFill>
+              <a:schemeClr val="bg2"/>
+            </a:solidFill>
+          </a:ln>
         </p:spPr>
         <p:style>
           <a:lnRef idx="2">
@@ -3820,7 +3856,7 @@
         </p:nvSpPr>
         <p:spPr>
           <a:xfrm>
-            <a:off x="0" y="5638671"/>
+            <a:off x="122895" y="5638671"/>
             <a:ext cx="2307762" cy="369332"/>
           </a:xfrm>
           <a:prstGeom prst="rect">
@@ -3835,30 +3871,34 @@
           <a:lstStyle/>
           <a:p>
             <a:r>
-              <a:rPr lang="en-US" dirty="0" smtClean="0"/>
+              <a:rPr lang="en-US" dirty="0" smtClean="0">
+                <a:latin typeface="+mj-lt"/>
+              </a:rPr>
               <a:t>Receiving Endpoint</a:t>
             </a:r>
-            <a:endParaRPr lang="en-US" dirty="0"/>
-          </a:p>
-        </p:txBody>
-      </p:sp>
-      <p:sp>
-        <p:nvSpPr>
-          <p:cNvPr id="6" name="Rectangle 5"/>
+            <a:endParaRPr lang="en-US" dirty="0">
+              <a:latin typeface="+mj-lt"/>
+            </a:endParaRPr>
+          </a:p>
+        </p:txBody>
+      </p:sp>
+      <p:sp>
+        <p:nvSpPr>
+          <p:cNvPr id="7" name="Rectangle 6"/>
           <p:cNvSpPr/>
           <p:nvPr/>
         </p:nvSpPr>
         <p:spPr>
           <a:xfrm>
-            <a:off x="2307762" y="892112"/>
-            <a:ext cx="5912790" cy="873891"/>
+            <a:off x="2430656" y="4960017"/>
+            <a:ext cx="5912791" cy="873891"/>
           </a:xfrm>
           <a:prstGeom prst="rect">
             <a:avLst/>
           </a:prstGeom>
           <a:solidFill>
             <a:schemeClr val="bg1">
-              <a:lumMod val="65000"/>
+              <a:lumMod val="50000"/>
             </a:schemeClr>
           </a:solidFill>
           <a:ln>
@@ -3892,7 +3932,7 @@
                   <a:schemeClr val="tx1"/>
                 </a:solidFill>
               </a:rPr>
-              <a:t>Media Decoder (Video)</a:t>
+              <a:t>UDP</a:t>
             </a:r>
             <a:endParaRPr lang="en-US" dirty="0">
               <a:solidFill>
@@ -3904,21 +3944,473 @@
       </p:sp>
       <p:sp>
         <p:nvSpPr>
-          <p:cNvPr id="7" name="Rectangle 6"/>
+          <p:cNvPr id="8" name="Rectangle 7"/>
           <p:cNvSpPr/>
           <p:nvPr/>
         </p:nvSpPr>
         <p:spPr>
           <a:xfrm>
-            <a:off x="2307761" y="4960017"/>
-            <a:ext cx="5912791" cy="873891"/>
+            <a:off x="1788855" y="2102801"/>
+            <a:ext cx="7032531" cy="2648983"/>
+          </a:xfrm>
+          <a:prstGeom prst="rect">
+            <a:avLst/>
+          </a:prstGeom>
+          <a:solidFill>
+            <a:schemeClr val="bg2"/>
+          </a:solidFill>
+          <a:ln w="3175" cmpd="sng">
+            <a:solidFill>
+              <a:schemeClr val="tx1"/>
+            </a:solidFill>
+            <a:prstDash val="solid"/>
+          </a:ln>
+        </p:spPr>
+        <p:style>
+          <a:lnRef idx="2">
+            <a:schemeClr val="accent4">
+              <a:shade val="50000"/>
+            </a:schemeClr>
+          </a:lnRef>
+          <a:fillRef idx="1">
+            <a:schemeClr val="accent4"/>
+          </a:fillRef>
+          <a:effectRef idx="0">
+            <a:schemeClr val="accent4"/>
+          </a:effectRef>
+          <a:fontRef idx="minor">
+            <a:schemeClr val="lt1"/>
+          </a:fontRef>
+        </p:style>
+        <p:txBody>
+          <a:bodyPr rtlCol="0" anchor="t"/>
+          <a:lstStyle/>
+          <a:p>
+            <a:r>
+              <a:rPr lang="en-US" sz="2400" dirty="0" smtClean="0">
+                <a:solidFill>
+                  <a:schemeClr val="tx1"/>
+                </a:solidFill>
+              </a:rPr>
+              <a:t>RTP</a:t>
+            </a:r>
+            <a:endParaRPr lang="en-US" sz="2400" dirty="0">
+              <a:solidFill>
+                <a:schemeClr val="tx1"/>
+              </a:solidFill>
+            </a:endParaRPr>
+          </a:p>
+        </p:txBody>
+      </p:sp>
+      <p:sp>
+        <p:nvSpPr>
+          <p:cNvPr id="9" name="Rectangle 8"/>
+          <p:cNvSpPr/>
+          <p:nvPr/>
+        </p:nvSpPr>
+        <p:spPr>
+          <a:xfrm>
+            <a:off x="6132373" y="2567048"/>
+            <a:ext cx="2211074" cy="1315649"/>
+          </a:xfrm>
+          <a:prstGeom prst="rect">
+            <a:avLst/>
+          </a:prstGeom>
+          <a:solidFill>
+            <a:schemeClr val="accent6">
+              <a:lumMod val="20000"/>
+              <a:lumOff val="80000"/>
+            </a:schemeClr>
+          </a:solidFill>
+          <a:ln w="3175" cmpd="sng">
+            <a:solidFill>
+              <a:schemeClr val="tx1"/>
+            </a:solidFill>
+            <a:prstDash val="dash"/>
+          </a:ln>
+        </p:spPr>
+        <p:style>
+          <a:lnRef idx="2">
+            <a:schemeClr val="accent4">
+              <a:shade val="50000"/>
+            </a:schemeClr>
+          </a:lnRef>
+          <a:fillRef idx="1">
+            <a:schemeClr val="accent4"/>
+          </a:fillRef>
+          <a:effectRef idx="0">
+            <a:schemeClr val="accent4"/>
+          </a:effectRef>
+          <a:fontRef idx="minor">
+            <a:schemeClr val="lt1"/>
+          </a:fontRef>
+        </p:style>
+        <p:txBody>
+          <a:bodyPr rtlCol="0" anchor="ctr"/>
+          <a:lstStyle/>
+          <a:p>
+            <a:pPr algn="ctr"/>
+            <a:r>
+              <a:rPr lang="en-US" sz="2000" dirty="0" smtClean="0">
+                <a:solidFill>
+                  <a:schemeClr val="tx1"/>
+                </a:solidFill>
+              </a:rPr>
+              <a:t>Receiver-side Measurements and Metrics</a:t>
+            </a:r>
+            <a:endParaRPr lang="en-US" sz="2000" dirty="0">
+              <a:solidFill>
+                <a:schemeClr val="tx1"/>
+              </a:solidFill>
+            </a:endParaRPr>
+          </a:p>
+        </p:txBody>
+      </p:sp>
+      <p:sp>
+        <p:nvSpPr>
+          <p:cNvPr id="10" name="Rectangle 9"/>
+          <p:cNvSpPr/>
+          <p:nvPr/>
+        </p:nvSpPr>
+        <p:spPr>
+          <a:xfrm>
+            <a:off x="2526246" y="4082710"/>
+            <a:ext cx="2853980" cy="453899"/>
+          </a:xfrm>
+          <a:prstGeom prst="rect">
+            <a:avLst/>
+          </a:prstGeom>
+          <a:solidFill>
+            <a:schemeClr val="accent6">
+              <a:lumMod val="20000"/>
+              <a:lumOff val="80000"/>
+            </a:schemeClr>
+          </a:solidFill>
+          <a:ln w="3175" cmpd="sng">
+            <a:solidFill>
+              <a:schemeClr val="tx1"/>
+            </a:solidFill>
+            <a:prstDash val="dash"/>
+          </a:ln>
+        </p:spPr>
+        <p:style>
+          <a:lnRef idx="2">
+            <a:schemeClr val="accent4">
+              <a:shade val="50000"/>
+            </a:schemeClr>
+          </a:lnRef>
+          <a:fillRef idx="1">
+            <a:schemeClr val="accent4"/>
+          </a:fillRef>
+          <a:effectRef idx="0">
+            <a:schemeClr val="accent4"/>
+          </a:effectRef>
+          <a:fontRef idx="minor">
+            <a:schemeClr val="lt1"/>
+          </a:fontRef>
+        </p:style>
+        <p:txBody>
+          <a:bodyPr rtlCol="0" anchor="ctr"/>
+          <a:lstStyle/>
+          <a:p>
+            <a:pPr algn="ctr"/>
+            <a:r>
+              <a:rPr lang="en-US" dirty="0" smtClean="0">
+                <a:solidFill>
+                  <a:schemeClr val="tx1"/>
+                </a:solidFill>
+              </a:rPr>
+              <a:t>De-jitter Buffer</a:t>
+            </a:r>
+            <a:endParaRPr lang="en-US" dirty="0">
+              <a:solidFill>
+                <a:schemeClr val="tx1"/>
+              </a:solidFill>
+            </a:endParaRPr>
+          </a:p>
+        </p:txBody>
+      </p:sp>
+      <p:sp>
+        <p:nvSpPr>
+          <p:cNvPr id="11" name="Rectangle 10"/>
+          <p:cNvSpPr/>
+          <p:nvPr/>
+        </p:nvSpPr>
+        <p:spPr>
+          <a:xfrm>
+            <a:off x="2526246" y="2567048"/>
+            <a:ext cx="2853980" cy="583845"/>
+          </a:xfrm>
+          <a:prstGeom prst="rect">
+            <a:avLst/>
+          </a:prstGeom>
+          <a:solidFill>
+            <a:schemeClr val="accent6">
+              <a:lumMod val="20000"/>
+              <a:lumOff val="80000"/>
+            </a:schemeClr>
+          </a:solidFill>
+          <a:ln w="3175" cmpd="sng">
+            <a:solidFill>
+              <a:schemeClr val="tx1"/>
+            </a:solidFill>
+            <a:prstDash val="dash"/>
+          </a:ln>
+        </p:spPr>
+        <p:style>
+          <a:lnRef idx="2">
+            <a:schemeClr val="accent4">
+              <a:shade val="50000"/>
+            </a:schemeClr>
+          </a:lnRef>
+          <a:fillRef idx="1">
+            <a:schemeClr val="accent4"/>
+          </a:fillRef>
+          <a:effectRef idx="0">
+            <a:schemeClr val="accent4"/>
+          </a:effectRef>
+          <a:fontRef idx="minor">
+            <a:schemeClr val="lt1"/>
+          </a:fontRef>
+        </p:style>
+        <p:txBody>
+          <a:bodyPr rtlCol="0" anchor="ctr"/>
+          <a:lstStyle/>
+          <a:p>
+            <a:pPr algn="ctr"/>
+            <a:r>
+              <a:rPr lang="en-US" dirty="0" smtClean="0">
+                <a:solidFill>
+                  <a:schemeClr val="tx1"/>
+                </a:solidFill>
+              </a:rPr>
+              <a:t>Media </a:t>
+            </a:r>
+            <a:r>
+              <a:rPr lang="en-US" dirty="0" err="1" smtClean="0">
+                <a:solidFill>
+                  <a:schemeClr val="tx1"/>
+                </a:solidFill>
+              </a:rPr>
+              <a:t>Depacketizer</a:t>
+            </a:r>
+            <a:endParaRPr lang="en-US" dirty="0">
+              <a:solidFill>
+                <a:schemeClr val="tx1"/>
+              </a:solidFill>
+            </a:endParaRPr>
+          </a:p>
+        </p:txBody>
+      </p:sp>
+      <p:sp>
+        <p:nvSpPr>
+          <p:cNvPr id="13" name="Rectangle 12"/>
+          <p:cNvSpPr/>
+          <p:nvPr/>
+        </p:nvSpPr>
+        <p:spPr>
+          <a:xfrm>
+            <a:off x="6132373" y="4055401"/>
+            <a:ext cx="2211074" cy="453900"/>
+          </a:xfrm>
+          <a:prstGeom prst="rect">
+            <a:avLst/>
+          </a:prstGeom>
+          <a:solidFill>
+            <a:schemeClr val="accent6">
+              <a:lumMod val="20000"/>
+              <a:lumOff val="80000"/>
+            </a:schemeClr>
+          </a:solidFill>
+          <a:ln w="3175" cmpd="sng">
+            <a:solidFill>
+              <a:schemeClr val="tx1"/>
+            </a:solidFill>
+            <a:prstDash val="dash"/>
+          </a:ln>
+        </p:spPr>
+        <p:style>
+          <a:lnRef idx="2">
+            <a:schemeClr val="accent4">
+              <a:shade val="50000"/>
+            </a:schemeClr>
+          </a:lnRef>
+          <a:fillRef idx="1">
+            <a:schemeClr val="accent4"/>
+          </a:fillRef>
+          <a:effectRef idx="0">
+            <a:schemeClr val="accent4"/>
+          </a:effectRef>
+          <a:fontRef idx="minor">
+            <a:schemeClr val="lt1"/>
+          </a:fontRef>
+        </p:style>
+        <p:txBody>
+          <a:bodyPr rtlCol="0" anchor="ctr"/>
+          <a:lstStyle/>
+          <a:p>
+            <a:pPr algn="ctr"/>
+            <a:r>
+              <a:rPr lang="en-US" dirty="0" smtClean="0">
+                <a:solidFill>
+                  <a:schemeClr val="tx1"/>
+                </a:solidFill>
+              </a:rPr>
+              <a:t>RTCP Feedback</a:t>
+            </a:r>
+            <a:endParaRPr lang="en-US" dirty="0">
+              <a:solidFill>
+                <a:schemeClr val="tx1"/>
+              </a:solidFill>
+            </a:endParaRPr>
+          </a:p>
+        </p:txBody>
+      </p:sp>
+      <p:sp>
+        <p:nvSpPr>
+          <p:cNvPr id="14" name="Rectangle 13"/>
+          <p:cNvSpPr/>
+          <p:nvPr/>
+        </p:nvSpPr>
+        <p:spPr>
+          <a:xfrm>
+            <a:off x="327727" y="837494"/>
+            <a:ext cx="1242641" cy="4738131"/>
+          </a:xfrm>
+          <a:prstGeom prst="rect">
+            <a:avLst/>
+          </a:prstGeom>
+          <a:solidFill>
+            <a:srgbClr val="E8E8E8"/>
+          </a:solidFill>
+          <a:ln w="3175" cmpd="sng">
+            <a:solidFill>
+              <a:schemeClr val="tx1"/>
+            </a:solidFill>
+            <a:prstDash val="sysDash"/>
+          </a:ln>
+        </p:spPr>
+        <p:style>
+          <a:lnRef idx="2">
+            <a:schemeClr val="accent4">
+              <a:shade val="50000"/>
+            </a:schemeClr>
+          </a:lnRef>
+          <a:fillRef idx="1">
+            <a:schemeClr val="accent4"/>
+          </a:fillRef>
+          <a:effectRef idx="0">
+            <a:schemeClr val="accent4"/>
+          </a:effectRef>
+          <a:fontRef idx="minor">
+            <a:schemeClr val="lt1"/>
+          </a:fontRef>
+        </p:style>
+        <p:txBody>
+          <a:bodyPr vert="vert270" rtlCol="0" anchor="ctr"/>
+          <a:lstStyle/>
+          <a:p>
+            <a:pPr algn="ctr"/>
+            <a:r>
+              <a:rPr lang="en-US" sz="2400" dirty="0" smtClean="0">
+                <a:solidFill>
+                  <a:schemeClr val="tx1"/>
+                </a:solidFill>
+              </a:rPr>
+              <a:t>Application </a:t>
+            </a:r>
+            <a:r>
+              <a:rPr lang="en-US" sz="2400" dirty="0">
+                <a:solidFill>
+                  <a:schemeClr val="tx1"/>
+                </a:solidFill>
+              </a:rPr>
+              <a:t>Preferences</a:t>
+            </a:r>
+          </a:p>
+        </p:txBody>
+      </p:sp>
+      <p:sp>
+        <p:nvSpPr>
+          <p:cNvPr id="16" name="Rectangle 15"/>
+          <p:cNvSpPr/>
+          <p:nvPr/>
+        </p:nvSpPr>
+        <p:spPr>
+          <a:xfrm>
+            <a:off x="2526246" y="3355718"/>
+            <a:ext cx="2853980" cy="526979"/>
+          </a:xfrm>
+          <a:prstGeom prst="rect">
+            <a:avLst/>
+          </a:prstGeom>
+          <a:solidFill>
+            <a:schemeClr val="accent6">
+              <a:lumMod val="20000"/>
+              <a:lumOff val="80000"/>
+            </a:schemeClr>
+          </a:solidFill>
+          <a:ln w="3175" cmpd="sng">
+            <a:solidFill>
+              <a:schemeClr val="tx1"/>
+            </a:solidFill>
+            <a:prstDash val="dash"/>
+          </a:ln>
+        </p:spPr>
+        <p:style>
+          <a:lnRef idx="2">
+            <a:schemeClr val="accent4">
+              <a:shade val="50000"/>
+            </a:schemeClr>
+          </a:lnRef>
+          <a:fillRef idx="1">
+            <a:schemeClr val="accent4"/>
+          </a:fillRef>
+          <a:effectRef idx="0">
+            <a:schemeClr val="accent4"/>
+          </a:effectRef>
+          <a:fontRef idx="minor">
+            <a:schemeClr val="lt1"/>
+          </a:fontRef>
+        </p:style>
+        <p:txBody>
+          <a:bodyPr rtlCol="0" anchor="ctr"/>
+          <a:lstStyle/>
+          <a:p>
+            <a:pPr algn="ctr"/>
+            <a:r>
+              <a:rPr lang="en-US" dirty="0" smtClean="0">
+                <a:solidFill>
+                  <a:schemeClr val="tx1"/>
+                </a:solidFill>
+              </a:rPr>
+              <a:t>Media Repair</a:t>
+            </a:r>
+            <a:endParaRPr lang="en-US" dirty="0">
+              <a:solidFill>
+                <a:schemeClr val="tx1"/>
+              </a:solidFill>
+            </a:endParaRPr>
+          </a:p>
+        </p:txBody>
+      </p:sp>
+      <p:sp>
+        <p:nvSpPr>
+          <p:cNvPr id="15" name="Rectangle 14"/>
+          <p:cNvSpPr/>
+          <p:nvPr/>
+        </p:nvSpPr>
+        <p:spPr>
+          <a:xfrm>
+            <a:off x="2430657" y="892112"/>
+            <a:ext cx="5912790" cy="873891"/>
           </a:xfrm>
           <a:prstGeom prst="rect">
             <a:avLst/>
           </a:prstGeom>
           <a:solidFill>
             <a:schemeClr val="bg1">
-              <a:lumMod val="50000"/>
+              <a:lumMod val="65000"/>
             </a:schemeClr>
           </a:solidFill>
           <a:ln>
@@ -3952,451 +4444,23 @@
                   <a:schemeClr val="tx1"/>
                 </a:solidFill>
               </a:rPr>
-              <a:t>UDP</a:t>
-            </a:r>
-            <a:endParaRPr lang="en-US" dirty="0">
-              <a:solidFill>
-                <a:schemeClr val="tx1"/>
-              </a:solidFill>
-            </a:endParaRPr>
-          </a:p>
-        </p:txBody>
-      </p:sp>
-      <p:sp>
-        <p:nvSpPr>
-          <p:cNvPr id="8" name="Rectangle 7"/>
-          <p:cNvSpPr/>
-          <p:nvPr/>
-        </p:nvSpPr>
-        <p:spPr>
-          <a:xfrm>
-            <a:off x="1665960" y="2102801"/>
-            <a:ext cx="7032531" cy="2648983"/>
-          </a:xfrm>
-          <a:prstGeom prst="rect">
-            <a:avLst/>
-          </a:prstGeom>
-          <a:solidFill>
-            <a:schemeClr val="bg2"/>
-          </a:solidFill>
-          <a:ln w="3175" cmpd="sng">
-            <a:solidFill>
-              <a:schemeClr val="tx1"/>
-            </a:solidFill>
-            <a:prstDash val="solid"/>
-          </a:ln>
-        </p:spPr>
-        <p:style>
-          <a:lnRef idx="2">
-            <a:schemeClr val="accent4">
-              <a:shade val="50000"/>
-            </a:schemeClr>
-          </a:lnRef>
-          <a:fillRef idx="1">
-            <a:schemeClr val="accent4"/>
-          </a:fillRef>
-          <a:effectRef idx="0">
-            <a:schemeClr val="accent4"/>
-          </a:effectRef>
-          <a:fontRef idx="minor">
-            <a:schemeClr val="lt1"/>
-          </a:fontRef>
-        </p:style>
-        <p:txBody>
-          <a:bodyPr rtlCol="0" anchor="t"/>
-          <a:lstStyle/>
-          <a:p>
-            <a:r>
-              <a:rPr lang="en-US" sz="2400" dirty="0" smtClean="0">
-                <a:solidFill>
-                  <a:schemeClr val="tx1"/>
-                </a:solidFill>
-              </a:rPr>
-              <a:t>RTP</a:t>
-            </a:r>
-            <a:endParaRPr lang="en-US" sz="2400" dirty="0">
-              <a:solidFill>
-                <a:schemeClr val="tx1"/>
-              </a:solidFill>
-            </a:endParaRPr>
-          </a:p>
-        </p:txBody>
-      </p:sp>
-      <p:sp>
-        <p:nvSpPr>
-          <p:cNvPr id="9" name="Rectangle 8"/>
-          <p:cNvSpPr/>
-          <p:nvPr/>
-        </p:nvSpPr>
-        <p:spPr>
-          <a:xfrm>
-            <a:off x="6009478" y="2567048"/>
-            <a:ext cx="2211074" cy="1315649"/>
-          </a:xfrm>
-          <a:prstGeom prst="rect">
-            <a:avLst/>
-          </a:prstGeom>
-          <a:solidFill>
-            <a:schemeClr val="accent6">
-              <a:lumMod val="20000"/>
-              <a:lumOff val="80000"/>
-            </a:schemeClr>
-          </a:solidFill>
-          <a:ln w="3175" cmpd="sng">
-            <a:solidFill>
-              <a:schemeClr val="tx1"/>
-            </a:solidFill>
-            <a:prstDash val="dash"/>
-          </a:ln>
-        </p:spPr>
-        <p:style>
-          <a:lnRef idx="2">
-            <a:schemeClr val="accent4">
-              <a:shade val="50000"/>
-            </a:schemeClr>
-          </a:lnRef>
-          <a:fillRef idx="1">
-            <a:schemeClr val="accent4"/>
-          </a:fillRef>
-          <a:effectRef idx="0">
-            <a:schemeClr val="accent4"/>
-          </a:effectRef>
-          <a:fontRef idx="minor">
-            <a:schemeClr val="lt1"/>
-          </a:fontRef>
-        </p:style>
-        <p:txBody>
-          <a:bodyPr rtlCol="0" anchor="ctr"/>
-          <a:lstStyle/>
-          <a:p>
-            <a:pPr algn="ctr"/>
-            <a:r>
-              <a:rPr lang="en-US" sz="2000" dirty="0" smtClean="0">
-                <a:solidFill>
-                  <a:schemeClr val="tx1"/>
-                </a:solidFill>
-              </a:rPr>
-              <a:t>Receiver-side Measurements and Metrics</a:t>
-            </a:r>
-            <a:endParaRPr lang="en-US" sz="2000" dirty="0">
-              <a:solidFill>
-                <a:schemeClr val="tx1"/>
-              </a:solidFill>
-            </a:endParaRPr>
-          </a:p>
-        </p:txBody>
-      </p:sp>
-      <p:sp>
-        <p:nvSpPr>
-          <p:cNvPr id="10" name="Rectangle 9"/>
-          <p:cNvSpPr/>
-          <p:nvPr/>
-        </p:nvSpPr>
-        <p:spPr>
-          <a:xfrm>
-            <a:off x="2403351" y="4082710"/>
-            <a:ext cx="2853980" cy="453899"/>
-          </a:xfrm>
-          <a:prstGeom prst="rect">
-            <a:avLst/>
-          </a:prstGeom>
-          <a:solidFill>
-            <a:schemeClr val="accent6">
-              <a:lumMod val="20000"/>
-              <a:lumOff val="80000"/>
-            </a:schemeClr>
-          </a:solidFill>
-          <a:ln w="3175" cmpd="sng">
-            <a:solidFill>
-              <a:schemeClr val="tx1"/>
-            </a:solidFill>
-            <a:prstDash val="dash"/>
-          </a:ln>
-        </p:spPr>
-        <p:style>
-          <a:lnRef idx="2">
-            <a:schemeClr val="accent4">
-              <a:shade val="50000"/>
-            </a:schemeClr>
-          </a:lnRef>
-          <a:fillRef idx="1">
-            <a:schemeClr val="accent4"/>
-          </a:fillRef>
-          <a:effectRef idx="0">
-            <a:schemeClr val="accent4"/>
-          </a:effectRef>
-          <a:fontRef idx="minor">
-            <a:schemeClr val="lt1"/>
-          </a:fontRef>
-        </p:style>
-        <p:txBody>
-          <a:bodyPr rtlCol="0" anchor="ctr"/>
-          <a:lstStyle/>
-          <a:p>
-            <a:pPr algn="ctr"/>
+              <a:t>Media Decoder </a:t>
+            </a:r>
             <a:r>
               <a:rPr lang="en-US" dirty="0" smtClean="0">
                 <a:solidFill>
                   <a:schemeClr val="tx1"/>
                 </a:solidFill>
               </a:rPr>
-              <a:t>De-jitter Buffer</a:t>
-            </a:r>
-            <a:endParaRPr lang="en-US" dirty="0">
-              <a:solidFill>
-                <a:schemeClr val="tx1"/>
-              </a:solidFill>
-            </a:endParaRPr>
-          </a:p>
-        </p:txBody>
-      </p:sp>
-      <p:sp>
-        <p:nvSpPr>
-          <p:cNvPr id="11" name="Rectangle 10"/>
-          <p:cNvSpPr/>
-          <p:nvPr/>
-        </p:nvSpPr>
-        <p:spPr>
-          <a:xfrm>
-            <a:off x="2403351" y="2567048"/>
-            <a:ext cx="2853980" cy="583845"/>
-          </a:xfrm>
-          <a:prstGeom prst="rect">
-            <a:avLst/>
-          </a:prstGeom>
-          <a:solidFill>
-            <a:schemeClr val="accent6">
-              <a:lumMod val="20000"/>
-              <a:lumOff val="80000"/>
-            </a:schemeClr>
-          </a:solidFill>
-          <a:ln w="3175" cmpd="sng">
-            <a:solidFill>
-              <a:schemeClr val="tx1"/>
-            </a:solidFill>
-            <a:prstDash val="dash"/>
-          </a:ln>
-        </p:spPr>
-        <p:style>
-          <a:lnRef idx="2">
-            <a:schemeClr val="accent4">
-              <a:shade val="50000"/>
-            </a:schemeClr>
-          </a:lnRef>
-          <a:fillRef idx="1">
-            <a:schemeClr val="accent4"/>
-          </a:fillRef>
-          <a:effectRef idx="0">
-            <a:schemeClr val="accent4"/>
-          </a:effectRef>
-          <a:fontRef idx="minor">
-            <a:schemeClr val="lt1"/>
-          </a:fontRef>
-        </p:style>
-        <p:txBody>
-          <a:bodyPr rtlCol="0" anchor="ctr"/>
-          <a:lstStyle/>
-          <a:p>
-            <a:pPr algn="ctr"/>
+              <a:t>(Audio/Video</a:t>
+            </a:r>
             <a:r>
               <a:rPr lang="en-US" dirty="0" smtClean="0">
                 <a:solidFill>
                   <a:schemeClr val="tx1"/>
                 </a:solidFill>
               </a:rPr>
-              <a:t>Media </a:t>
-            </a:r>
-            <a:r>
-              <a:rPr lang="en-US" dirty="0" err="1" smtClean="0">
-                <a:solidFill>
-                  <a:schemeClr val="tx1"/>
-                </a:solidFill>
-              </a:rPr>
-              <a:t>Depacketizer</a:t>
-            </a:r>
-            <a:endParaRPr lang="en-US" dirty="0">
-              <a:solidFill>
-                <a:schemeClr val="tx1"/>
-              </a:solidFill>
-            </a:endParaRPr>
-          </a:p>
-        </p:txBody>
-      </p:sp>
-      <p:sp>
-        <p:nvSpPr>
-          <p:cNvPr id="13" name="Rectangle 12"/>
-          <p:cNvSpPr/>
-          <p:nvPr/>
-        </p:nvSpPr>
-        <p:spPr>
-          <a:xfrm>
-            <a:off x="6009478" y="4055401"/>
-            <a:ext cx="2211074" cy="453900"/>
-          </a:xfrm>
-          <a:prstGeom prst="rect">
-            <a:avLst/>
-          </a:prstGeom>
-          <a:solidFill>
-            <a:schemeClr val="accent6">
-              <a:lumMod val="20000"/>
-              <a:lumOff val="80000"/>
-            </a:schemeClr>
-          </a:solidFill>
-          <a:ln w="3175" cmpd="sng">
-            <a:solidFill>
-              <a:schemeClr val="tx1"/>
-            </a:solidFill>
-            <a:prstDash val="dash"/>
-          </a:ln>
-        </p:spPr>
-        <p:style>
-          <a:lnRef idx="2">
-            <a:schemeClr val="accent4">
-              <a:shade val="50000"/>
-            </a:schemeClr>
-          </a:lnRef>
-          <a:fillRef idx="1">
-            <a:schemeClr val="accent4"/>
-          </a:fillRef>
-          <a:effectRef idx="0">
-            <a:schemeClr val="accent4"/>
-          </a:effectRef>
-          <a:fontRef idx="minor">
-            <a:schemeClr val="lt1"/>
-          </a:fontRef>
-        </p:style>
-        <p:txBody>
-          <a:bodyPr rtlCol="0" anchor="ctr"/>
-          <a:lstStyle/>
-          <a:p>
-            <a:pPr algn="ctr"/>
-            <a:r>
-              <a:rPr lang="en-US" dirty="0" smtClean="0">
-                <a:solidFill>
-                  <a:schemeClr val="tx1"/>
-                </a:solidFill>
-              </a:rPr>
-              <a:t>RTCP Feedback</a:t>
-            </a:r>
-            <a:endParaRPr lang="en-US" dirty="0">
-              <a:solidFill>
-                <a:schemeClr val="tx1"/>
-              </a:solidFill>
-            </a:endParaRPr>
-          </a:p>
-        </p:txBody>
-      </p:sp>
-      <p:sp>
-        <p:nvSpPr>
-          <p:cNvPr id="14" name="Rectangle 13"/>
-          <p:cNvSpPr/>
-          <p:nvPr/>
-        </p:nvSpPr>
-        <p:spPr>
-          <a:xfrm>
-            <a:off x="204832" y="837494"/>
-            <a:ext cx="1242641" cy="4738131"/>
-          </a:xfrm>
-          <a:prstGeom prst="rect">
-            <a:avLst/>
-          </a:prstGeom>
-          <a:solidFill>
-            <a:srgbClr val="E8E8E8"/>
-          </a:solidFill>
-          <a:ln w="3175" cmpd="sng">
-            <a:solidFill>
-              <a:schemeClr val="tx1"/>
-            </a:solidFill>
-            <a:prstDash val="sysDash"/>
-          </a:ln>
-        </p:spPr>
-        <p:style>
-          <a:lnRef idx="2">
-            <a:schemeClr val="accent4">
-              <a:shade val="50000"/>
-            </a:schemeClr>
-          </a:lnRef>
-          <a:fillRef idx="1">
-            <a:schemeClr val="accent4"/>
-          </a:fillRef>
-          <a:effectRef idx="0">
-            <a:schemeClr val="accent4"/>
-          </a:effectRef>
-          <a:fontRef idx="minor">
-            <a:schemeClr val="lt1"/>
-          </a:fontRef>
-        </p:style>
-        <p:txBody>
-          <a:bodyPr vert="vert270" rtlCol="0" anchor="ctr"/>
-          <a:lstStyle/>
-          <a:p>
-            <a:pPr algn="ctr"/>
-            <a:r>
-              <a:rPr lang="en-US" sz="2400" dirty="0" smtClean="0">
-                <a:solidFill>
-                  <a:schemeClr val="tx1"/>
-                </a:solidFill>
-              </a:rPr>
-              <a:t>Multimedia Application Settings</a:t>
-            </a:r>
-          </a:p>
-        </p:txBody>
-      </p:sp>
-      <p:sp>
-        <p:nvSpPr>
-          <p:cNvPr id="16" name="Rectangle 15"/>
-          <p:cNvSpPr/>
-          <p:nvPr/>
-        </p:nvSpPr>
-        <p:spPr>
-          <a:xfrm>
-            <a:off x="2403351" y="3355718"/>
-            <a:ext cx="2853980" cy="526979"/>
-          </a:xfrm>
-          <a:prstGeom prst="rect">
-            <a:avLst/>
-          </a:prstGeom>
-          <a:solidFill>
-            <a:schemeClr val="accent6">
-              <a:lumMod val="20000"/>
-              <a:lumOff val="80000"/>
-            </a:schemeClr>
-          </a:solidFill>
-          <a:ln w="3175" cmpd="sng">
-            <a:solidFill>
-              <a:schemeClr val="tx1"/>
-            </a:solidFill>
-            <a:prstDash val="dash"/>
-          </a:ln>
-        </p:spPr>
-        <p:style>
-          <a:lnRef idx="2">
-            <a:schemeClr val="accent4">
-              <a:shade val="50000"/>
-            </a:schemeClr>
-          </a:lnRef>
-          <a:fillRef idx="1">
-            <a:schemeClr val="accent4"/>
-          </a:fillRef>
-          <a:effectRef idx="0">
-            <a:schemeClr val="accent4"/>
-          </a:effectRef>
-          <a:fontRef idx="minor">
-            <a:schemeClr val="lt1"/>
-          </a:fontRef>
-        </p:style>
-        <p:txBody>
-          <a:bodyPr rtlCol="0" anchor="ctr"/>
-          <a:lstStyle/>
-          <a:p>
-            <a:pPr algn="ctr"/>
-            <a:r>
-              <a:rPr lang="en-US" dirty="0" smtClean="0">
-                <a:solidFill>
-                  <a:schemeClr val="tx1"/>
-                </a:solidFill>
-              </a:rPr>
-              <a:t>Media Repair</a:t>
+              <a:t>)</a:t>
             </a:r>
             <a:endParaRPr lang="en-US" dirty="0">
               <a:solidFill>
@@ -4954,26 +5018,13 @@
           <a:p>
             <a:r>
               <a:rPr lang="en-US" sz="1400" dirty="0" smtClean="0"/>
-              <a:t>- RTP</a:t>
-            </a:r>
+              <a:t>- RTP/RTCP</a:t>
+            </a:r>
+          </a:p>
+          <a:p>
             <a:r>
               <a:rPr lang="en-US" sz="1400" dirty="0" smtClean="0"/>
-              <a:t>/</a:t>
-            </a:r>
-            <a:r>
-              <a:rPr lang="en-US" sz="1400" dirty="0" smtClean="0"/>
-              <a:t>RTCP</a:t>
-            </a:r>
-            <a:endParaRPr lang="en-US" sz="1400" dirty="0" smtClean="0"/>
-          </a:p>
-          <a:p>
-            <a:r>
-              <a:rPr lang="en-US" sz="1400" dirty="0" smtClean="0"/>
-              <a:t>- </a:t>
-            </a:r>
-            <a:r>
-              <a:rPr lang="en-US" sz="1400" dirty="0" smtClean="0"/>
-              <a:t>Capacity est.</a:t>
+              <a:t>- Capacity est.</a:t>
             </a:r>
           </a:p>
         </p:txBody>

</xml_diff>

<commit_message>
media encoder!!! not decoder.
FIXED — thanks to Joerg Widmer
</commit_message>
<xml_diff>
--- a/graphs/source/media-app-stack.pptx
+++ b/graphs/source/media-app-stack.pptx
@@ -290,7 +290,7 @@
           <a:p>
             <a:fld id="{40CA469B-057B-A14D-B584-C7C64D035322}" type="datetimeFigureOut">
               <a:rPr lang="en-US" smtClean="0"/>
-              <a:t>21/03/14</a:t>
+              <a:t>17/06/14</a:t>
             </a:fld>
             <a:endParaRPr lang="en-US"/>
           </a:p>
@@ -460,7 +460,7 @@
           <a:p>
             <a:fld id="{40CA469B-057B-A14D-B584-C7C64D035322}" type="datetimeFigureOut">
               <a:rPr lang="en-US" smtClean="0"/>
-              <a:t>21/03/14</a:t>
+              <a:t>17/06/14</a:t>
             </a:fld>
             <a:endParaRPr lang="en-US"/>
           </a:p>
@@ -640,7 +640,7 @@
           <a:p>
             <a:fld id="{40CA469B-057B-A14D-B584-C7C64D035322}" type="datetimeFigureOut">
               <a:rPr lang="en-US" smtClean="0"/>
-              <a:t>21/03/14</a:t>
+              <a:t>17/06/14</a:t>
             </a:fld>
             <a:endParaRPr lang="en-US"/>
           </a:p>
@@ -810,7 +810,7 @@
           <a:p>
             <a:fld id="{40CA469B-057B-A14D-B584-C7C64D035322}" type="datetimeFigureOut">
               <a:rPr lang="en-US" smtClean="0"/>
-              <a:t>21/03/14</a:t>
+              <a:t>17/06/14</a:t>
             </a:fld>
             <a:endParaRPr lang="en-US"/>
           </a:p>
@@ -1056,7 +1056,7 @@
           <a:p>
             <a:fld id="{40CA469B-057B-A14D-B584-C7C64D035322}" type="datetimeFigureOut">
               <a:rPr lang="en-US" smtClean="0"/>
-              <a:t>21/03/14</a:t>
+              <a:t>17/06/14</a:t>
             </a:fld>
             <a:endParaRPr lang="en-US"/>
           </a:p>
@@ -1344,7 +1344,7 @@
           <a:p>
             <a:fld id="{40CA469B-057B-A14D-B584-C7C64D035322}" type="datetimeFigureOut">
               <a:rPr lang="en-US" smtClean="0"/>
-              <a:t>21/03/14</a:t>
+              <a:t>17/06/14</a:t>
             </a:fld>
             <a:endParaRPr lang="en-US"/>
           </a:p>
@@ -1766,7 +1766,7 @@
           <a:p>
             <a:fld id="{40CA469B-057B-A14D-B584-C7C64D035322}" type="datetimeFigureOut">
               <a:rPr lang="en-US" smtClean="0"/>
-              <a:t>21/03/14</a:t>
+              <a:t>17/06/14</a:t>
             </a:fld>
             <a:endParaRPr lang="en-US"/>
           </a:p>
@@ -1884,7 +1884,7 @@
           <a:p>
             <a:fld id="{40CA469B-057B-A14D-B584-C7C64D035322}" type="datetimeFigureOut">
               <a:rPr lang="en-US" smtClean="0"/>
-              <a:t>21/03/14</a:t>
+              <a:t>17/06/14</a:t>
             </a:fld>
             <a:endParaRPr lang="en-US"/>
           </a:p>
@@ -1979,7 +1979,7 @@
           <a:p>
             <a:fld id="{40CA469B-057B-A14D-B584-C7C64D035322}" type="datetimeFigureOut">
               <a:rPr lang="en-US" smtClean="0"/>
-              <a:t>21/03/14</a:t>
+              <a:t>17/06/14</a:t>
             </a:fld>
             <a:endParaRPr lang="en-US"/>
           </a:p>
@@ -2256,7 +2256,7 @@
           <a:p>
             <a:fld id="{40CA469B-057B-A14D-B584-C7C64D035322}" type="datetimeFigureOut">
               <a:rPr lang="en-US" smtClean="0"/>
-              <a:t>21/03/14</a:t>
+              <a:t>17/06/14</a:t>
             </a:fld>
             <a:endParaRPr lang="en-US"/>
           </a:p>
@@ -2509,7 +2509,7 @@
           <a:p>
             <a:fld id="{40CA469B-057B-A14D-B584-C7C64D035322}" type="datetimeFigureOut">
               <a:rPr lang="en-US" smtClean="0"/>
-              <a:t>21/03/14</a:t>
+              <a:t>17/06/14</a:t>
             </a:fld>
             <a:endParaRPr lang="en-US"/>
           </a:p>
@@ -2722,7 +2722,7 @@
           <a:p>
             <a:fld id="{40CA469B-057B-A14D-B584-C7C64D035322}" type="datetimeFigureOut">
               <a:rPr lang="en-US" smtClean="0"/>
-              <a:t>21/03/14</a:t>
+              <a:t>17/06/14</a:t>
             </a:fld>
             <a:endParaRPr lang="en-US"/>
           </a:p>
@@ -3590,7 +3590,7 @@
                   <a:schemeClr val="tx1"/>
                 </a:solidFill>
               </a:rPr>
-              <a:t>Media Decoder </a:t>
+              <a:t>Media </a:t>
             </a:r>
             <a:r>
               <a:rPr lang="en-US" dirty="0" smtClean="0">
@@ -3598,7 +3598,7 @@
                   <a:schemeClr val="tx1"/>
                 </a:solidFill>
               </a:rPr>
-              <a:t>(Audio/Video</a:t>
+              <a:t>Encoder </a:t>
             </a:r>
             <a:r>
               <a:rPr lang="en-US" dirty="0" smtClean="0">
@@ -3606,7 +3606,7 @@
                   <a:schemeClr val="tx1"/>
                 </a:solidFill>
               </a:rPr>
-              <a:t>)</a:t>
+              <a:t>(Audio/Video)</a:t>
             </a:r>
             <a:endParaRPr lang="en-US" dirty="0">
               <a:solidFill>
@@ -4444,23 +4444,7 @@
                   <a:schemeClr val="tx1"/>
                 </a:solidFill>
               </a:rPr>
-              <a:t>Media Decoder </a:t>
-            </a:r>
-            <a:r>
-              <a:rPr lang="en-US" dirty="0" smtClean="0">
-                <a:solidFill>
-                  <a:schemeClr val="tx1"/>
-                </a:solidFill>
-              </a:rPr>
-              <a:t>(Audio/Video</a:t>
-            </a:r>
-            <a:r>
-              <a:rPr lang="en-US" dirty="0" smtClean="0">
-                <a:solidFill>
-                  <a:schemeClr val="tx1"/>
-                </a:solidFill>
-              </a:rPr>
-              <a:t>)</a:t>
+              <a:t>Media Decoder (Audio/Video)</a:t>
             </a:r>
             <a:endParaRPr lang="en-US" dirty="0">
               <a:solidFill>

</xml_diff>